<commit_message>
Añadi carpeta trabajo y actualizacion de Design Thinking
</commit_message>
<xml_diff>
--- a/Presentacion/Design_Thinking.pptx
+++ b/Presentacion/Design_Thinking.pptx
@@ -3537,7 +3537,7 @@
           <a:p>
             <a:r>
               <a:rPr lang="es-ES" dirty="0"/>
-              <a:t>DEFINICION</a:t>
+              <a:t>DEFINICIÓN</a:t>
             </a:r>
             <a:endParaRPr lang="es-CL" dirty="0"/>
           </a:p>
@@ -3627,11 +3627,8 @@
                 <a:latin typeface="Arial" panose="020B0604020202020204" pitchFamily="34" charset="0"/>
                 <a:cs typeface="Arial" panose="020B0604020202020204" pitchFamily="34" charset="0"/>
               </a:rPr>
-              <a:t>El objetivo de nuestro proyecto será defender a nuestro cliente ante cualquier tipo de abuso físico y/o psicológico, protegiendo la privacidad e integridad del mismo.</a:t>
-            </a:r>
-          </a:p>
-          <a:p>
-            <a:pPr algn="just"/>
+              <a:t>El objetivo de nuestro proyecto será defender a nuestro cliente ante cualquier tipo de abuso físico y/o psicológico, protegiendo la privacidad e integridad del mismo. </a:t>
+            </a:r>
             <a:endParaRPr lang="es-CL" sz="1800" dirty="0">
               <a:latin typeface="Arial" panose="020B0604020202020204" pitchFamily="34" charset="0"/>
               <a:cs typeface="Arial" panose="020B0604020202020204" pitchFamily="34" charset="0"/>
@@ -3692,7 +3689,7 @@
           <a:p>
             <a:r>
               <a:rPr lang="es-ES" dirty="0"/>
-              <a:t>DEFINICION</a:t>
+              <a:t>DEFINICIÓN</a:t>
             </a:r>
             <a:endParaRPr lang="es-CL" dirty="0"/>
           </a:p>
@@ -3796,7 +3793,7 @@
                 <a:latin typeface="Arial" panose="020B0604020202020204" pitchFamily="34" charset="0"/>
                 <a:cs typeface="Arial" panose="020B0604020202020204" pitchFamily="34" charset="0"/>
               </a:rPr>
-              <a:t>APP ELLES: Nulo Costo – Calidad Alta – Accesible </a:t>
+              <a:t>APP ELLES: Nulo Costo – Calidad Alta – Accesible</a:t>
             </a:r>
           </a:p>
         </p:txBody>
@@ -3942,7 +3939,7 @@
           <a:p>
             <a:r>
               <a:rPr lang="es-ES" dirty="0"/>
-              <a:t>DEFINICION</a:t>
+              <a:t>DEFINICIÓN</a:t>
             </a:r>
             <a:endParaRPr lang="es-CL" dirty="0"/>
           </a:p>
@@ -4976,7 +4973,7 @@
                 <a:latin typeface="Arial" panose="020B0604020202020204" pitchFamily="34" charset="0"/>
                 <a:cs typeface="Arial" panose="020B0604020202020204" pitchFamily="34" charset="0"/>
               </a:rPr>
-              <a:t>La obtención del producto tendrá derecho a una cuenta personal en nuestra web y aplicación móvil, la cual tendrá opciones como información de apoyo, denuncias, gestión de cuentas, entre otras.</a:t>
+              <a:t>La obtención del producto tendrá derecho a una cuenta personal en nuestra web y aplicación móvil, la cual tendrá opciones como información de apoyo, denuncias, gestión de cuentas, entre otras. </a:t>
             </a:r>
           </a:p>
         </p:txBody>
@@ -5999,7 +5996,7 @@
           <a:p>
             <a:r>
               <a:rPr lang="es-ES" dirty="0"/>
-              <a:t>EMPATIA</a:t>
+              <a:t>EMPATÍA</a:t>
             </a:r>
             <a:endParaRPr lang="es-CL" dirty="0"/>
           </a:p>
@@ -6137,7 +6134,7 @@
           <a:p>
             <a:r>
               <a:rPr lang="es-ES" dirty="0"/>
-              <a:t>EMPATIA</a:t>
+              <a:t>EMPATÍA</a:t>
             </a:r>
             <a:endParaRPr lang="es-CL" dirty="0"/>
           </a:p>
@@ -6284,7 +6281,7 @@
           <a:p>
             <a:r>
               <a:rPr lang="es-ES" dirty="0"/>
-              <a:t>EMPATIA</a:t>
+              <a:t>EMPATÍA</a:t>
             </a:r>
             <a:endParaRPr lang="es-CL" dirty="0"/>
           </a:p>
@@ -6418,7 +6415,7 @@
           <a:p>
             <a:r>
               <a:rPr lang="es-ES" dirty="0"/>
-              <a:t>EMPATIA</a:t>
+              <a:t>EMPATÍA</a:t>
             </a:r>
             <a:endParaRPr lang="es-CL" dirty="0"/>
           </a:p>
@@ -6552,7 +6549,7 @@
           <a:p>
             <a:r>
               <a:rPr lang="es-ES" dirty="0"/>
-              <a:t>EMPATIA</a:t>
+              <a:t>EMPATÍA</a:t>
             </a:r>
             <a:endParaRPr lang="es-CL" dirty="0"/>
           </a:p>
@@ -6686,7 +6683,7 @@
           <a:p>
             <a:r>
               <a:rPr lang="es-ES" dirty="0"/>
-              <a:t>EMPATIA</a:t>
+              <a:t>EMPATÍA</a:t>
             </a:r>
             <a:endParaRPr lang="es-CL" dirty="0"/>
           </a:p>
@@ -6775,7 +6772,7 @@
           <a:p>
             <a:r>
               <a:rPr lang="es-ES" dirty="0"/>
-              <a:t>EMPATIA</a:t>
+              <a:t>EMPATÍA</a:t>
             </a:r>
             <a:endParaRPr lang="es-CL" dirty="0"/>
           </a:p>
@@ -6864,7 +6861,7 @@
           <a:p>
             <a:r>
               <a:rPr lang="es-ES" dirty="0"/>
-              <a:t>EMPATIA</a:t>
+              <a:t>EMPATÍA</a:t>
             </a:r>
             <a:endParaRPr lang="es-CL" dirty="0"/>
           </a:p>

</xml_diff>